<commit_message>
fixed wrong instruction 0 for even and 1 for odd now
</commit_message>
<xml_diff>
--- a/presenntation.pptx
+++ b/presenntation.pptx
@@ -9635,7 +9635,23 @@
           <a:p>
             <a:r>
               <a:rPr lang="en-US" i="1" dirty="0"/>
-              <a:t>Create a method that checks if the integer value is an even or odd number, return 1 for even and 0 for odd. </a:t>
+              <a:t>Create a method that checks if the integer value is an even or odd number, </a:t>
+            </a:r>
+            <a:r>
+              <a:rPr lang="en-US" i="1"/>
+              <a:t>return 0 </a:t>
+            </a:r>
+            <a:r>
+              <a:rPr lang="en-US" i="1" dirty="0"/>
+              <a:t>for even </a:t>
+            </a:r>
+            <a:r>
+              <a:rPr lang="en-US" i="1"/>
+              <a:t>and 1 </a:t>
+            </a:r>
+            <a:r>
+              <a:rPr lang="en-US" i="1" dirty="0"/>
+              <a:t>for odd. </a:t>
             </a:r>
           </a:p>
           <a:p>

</xml_diff>